<commit_message>
Segunda clase - presentaciones
</commit_message>
<xml_diff>
--- a/Presentations/0. Introducción Curso .NET.pptx
+++ b/Presentations/0. Introducción Curso .NET.pptx
@@ -15,7 +15,8 @@
     <p:sldId id="263" r:id="rId9"/>
     <p:sldId id="264" r:id="rId10"/>
     <p:sldId id="266" r:id="rId11"/>
-    <p:sldId id="267" r:id="rId12"/>
+    <p:sldId id="268" r:id="rId12"/>
+    <p:sldId id="267" r:id="rId13"/>
   </p:sldIdLst>
   <p:sldSz cx="12192000" cy="6858000"/>
   <p:notesSz cx="6858000" cy="9144000"/>
@@ -390,7 +391,7 @@
             <a:fld id="{5586B75A-687E-405C-8A0B-8D00578BA2C3}" type="datetimeFigureOut">
               <a:rPr lang="en-US" dirty="0"/>
               <a:pPr/>
-              <a:t>6/5/2018</a:t>
+              <a:t>6/12/2018</a:t>
             </a:fld>
             <a:endParaRPr lang="en-US" dirty="0"/>
           </a:p>
@@ -761,7 +762,7 @@
           <a:p>
             <a:fld id="{5F4E5243-F52A-4D37-9694-EB26C6C31910}" type="datetimeFigureOut">
               <a:rPr lang="en-US" dirty="0"/>
-              <a:t>6/5/2018</a:t>
+              <a:t>6/12/2018</a:t>
             </a:fld>
             <a:endParaRPr lang="en-US" dirty="0"/>
           </a:p>
@@ -936,7 +937,7 @@
           <a:p>
             <a:fld id="{3A77B6E1-634A-48DC-9E8B-D894023267EF}" type="datetimeFigureOut">
               <a:rPr lang="en-US" dirty="0"/>
-              <a:t>6/5/2018</a:t>
+              <a:t>6/12/2018</a:t>
             </a:fld>
             <a:endParaRPr lang="en-US" dirty="0"/>
           </a:p>
@@ -1196,7 +1197,7 @@
           <a:p>
             <a:fld id="{7B2D3E9E-A95C-48F2-B4BF-A71542E0BE9A}" type="datetimeFigureOut">
               <a:rPr lang="en-US" dirty="0"/>
-              <a:t>6/5/2018</a:t>
+              <a:t>6/12/2018</a:t>
             </a:fld>
             <a:endParaRPr lang="en-US" dirty="0"/>
           </a:p>
@@ -1448,7 +1449,7 @@
             <a:fld id="{5586B75A-687E-405C-8A0B-8D00578BA2C3}" type="datetimeFigureOut">
               <a:rPr lang="en-US" dirty="0"/>
               <a:pPr/>
-              <a:t>6/5/2018</a:t>
+              <a:t>6/12/2018</a:t>
             </a:fld>
             <a:endParaRPr lang="en-US" dirty="0"/>
           </a:p>
@@ -1732,7 +1733,7 @@
           <a:p>
             <a:fld id="{F12952B5-7A2F-4CC8-B7CE-9234E21C2837}" type="datetimeFigureOut">
               <a:rPr lang="en-US" dirty="0"/>
-              <a:t>6/5/2018</a:t>
+              <a:t>6/12/2018</a:t>
             </a:fld>
             <a:endParaRPr lang="en-US" dirty="0"/>
           </a:p>
@@ -2165,7 +2166,7 @@
           <a:p>
             <a:fld id="{CE1DA07A-9201-4B4B-BAF2-015AFA30F520}" type="datetimeFigureOut">
               <a:rPr lang="en-US" dirty="0"/>
-              <a:t>6/5/2018</a:t>
+              <a:t>6/12/2018</a:t>
             </a:fld>
             <a:endParaRPr lang="en-US" dirty="0"/>
           </a:p>
@@ -2278,7 +2279,7 @@
           <a:p>
             <a:fld id="{73D7E00A-486F-4252-8B1D-E32645521F49}" type="datetimeFigureOut">
               <a:rPr lang="en-US" dirty="0"/>
-              <a:t>6/5/2018</a:t>
+              <a:t>6/12/2018</a:t>
             </a:fld>
             <a:endParaRPr lang="en-US" dirty="0"/>
           </a:p>
@@ -2368,7 +2369,7 @@
           <a:p>
             <a:fld id="{8DDF5F92-E675-4B36-9A60-69A962A68675}" type="datetimeFigureOut">
               <a:rPr lang="en-US" dirty="0"/>
-              <a:t>6/5/2018</a:t>
+              <a:t>6/12/2018</a:t>
             </a:fld>
             <a:endParaRPr lang="en-US" dirty="0"/>
           </a:p>
@@ -2719,7 +2720,7 @@
           <a:p>
             <a:fld id="{AF6E2C9B-5FA2-460D-9BE7-B0812FC2A6FF}" type="datetimeFigureOut">
               <a:rPr lang="en-US" dirty="0"/>
-              <a:t>6/5/2018</a:t>
+              <a:t>6/12/2018</a:t>
             </a:fld>
             <a:endParaRPr lang="en-US" dirty="0"/>
           </a:p>
@@ -3032,7 +3033,7 @@
             <a:fld id="{5586B75A-687E-405C-8A0B-8D00578BA2C3}" type="datetimeFigureOut">
               <a:rPr lang="en-US" dirty="0"/>
               <a:pPr/>
-              <a:t>6/5/2018</a:t>
+              <a:t>6/12/2018</a:t>
             </a:fld>
             <a:endParaRPr lang="en-US" dirty="0"/>
           </a:p>
@@ -3262,7 +3263,7 @@
             <a:fld id="{5586B75A-687E-405C-8A0B-8D00578BA2C3}" type="datetimeFigureOut">
               <a:rPr lang="en-US" dirty="0"/>
               <a:pPr/>
-              <a:t>6/5/2018</a:t>
+              <a:t>6/12/2018</a:t>
             </a:fld>
             <a:endParaRPr lang="en-US" dirty="0"/>
           </a:p>
@@ -4091,6 +4092,107 @@
           <p:cNvPr id="2" name="Título 1">
             <a:extLst>
               <a:ext uri="{FF2B5EF4-FFF2-40B4-BE49-F238E27FC236}">
+                <a16:creationId xmlns:a16="http://schemas.microsoft.com/office/drawing/2014/main" id="{44970AC8-9823-4C91-A6F2-CBACCB38204C}"/>
+              </a:ext>
+            </a:extLst>
+          </p:cNvPr>
+          <p:cNvSpPr>
+            <a:spLocks noGrp="1"/>
+          </p:cNvSpPr>
+          <p:nvPr>
+            <p:ph type="title"/>
+          </p:nvPr>
+        </p:nvSpPr>
+        <p:spPr/>
+        <p:txBody>
+          <a:bodyPr/>
+          <a:lstStyle/>
+          <a:p>
+            <a:r>
+              <a:rPr lang="es-CO" dirty="0"/>
+              <a:t>Herramientas en clase </a:t>
+            </a:r>
+          </a:p>
+        </p:txBody>
+      </p:sp>
+      <p:sp>
+        <p:nvSpPr>
+          <p:cNvPr id="3" name="Marcador de contenido 2">
+            <a:extLst>
+              <a:ext uri="{FF2B5EF4-FFF2-40B4-BE49-F238E27FC236}">
+                <a16:creationId xmlns:a16="http://schemas.microsoft.com/office/drawing/2014/main" id="{0A1432D6-E3E9-4D3E-8A5A-D7962BBB9609}"/>
+              </a:ext>
+            </a:extLst>
+          </p:cNvPr>
+          <p:cNvSpPr>
+            <a:spLocks noGrp="1"/>
+          </p:cNvSpPr>
+          <p:nvPr>
+            <p:ph idx="1"/>
+          </p:nvPr>
+        </p:nvSpPr>
+        <p:spPr/>
+        <p:txBody>
+          <a:bodyPr/>
+          <a:lstStyle/>
+          <a:p>
+            <a:r>
+              <a:rPr lang="es-CO" dirty="0"/>
+              <a:t>Para compartirles pantalla en las charlas</a:t>
+            </a:r>
+          </a:p>
+          <a:p>
+            <a:endParaRPr lang="es-CO" dirty="0"/>
+          </a:p>
+          <a:p>
+            <a:r>
+              <a:rPr lang="es-CO" dirty="0">
+                <a:hlinkClick r:id="rId2"/>
+              </a:rPr>
+              <a:t>https://www.tightvnc.com/download.php</a:t>
+            </a:r>
+            <a:r>
+              <a:rPr lang="es-CO" dirty="0"/>
+              <a:t> </a:t>
+            </a:r>
+          </a:p>
+        </p:txBody>
+      </p:sp>
+    </p:spTree>
+    <p:extLst>
+      <p:ext uri="{BB962C8B-B14F-4D97-AF65-F5344CB8AC3E}">
+        <p14:creationId xmlns:p14="http://schemas.microsoft.com/office/powerpoint/2010/main" val="4229758073"/>
+      </p:ext>
+    </p:extLst>
+  </p:cSld>
+  <p:clrMapOvr>
+    <a:masterClrMapping/>
+  </p:clrMapOvr>
+</p:sld>
+</file>
+
+<file path=ppt/slides/slide12.xml><?xml version="1.0" encoding="utf-8"?>
+<p:sld xmlns:a="http://schemas.openxmlformats.org/drawingml/2006/main" xmlns:r="http://schemas.openxmlformats.org/officeDocument/2006/relationships" xmlns:p="http://schemas.openxmlformats.org/presentationml/2006/main">
+  <p:cSld>
+    <p:spTree>
+      <p:nvGrpSpPr>
+        <p:cNvPr id="1" name=""/>
+        <p:cNvGrpSpPr/>
+        <p:nvPr/>
+      </p:nvGrpSpPr>
+      <p:grpSpPr>
+        <a:xfrm>
+          <a:off x="0" y="0"/>
+          <a:ext cx="0" cy="0"/>
+          <a:chOff x="0" y="0"/>
+          <a:chExt cx="0" cy="0"/>
+        </a:xfrm>
+      </p:grpSpPr>
+      <p:sp>
+        <p:nvSpPr>
+          <p:cNvPr id="2" name="Título 1">
+            <a:extLst>
+              <a:ext uri="{FF2B5EF4-FFF2-40B4-BE49-F238E27FC236}">
                 <a16:creationId xmlns:a16="http://schemas.microsoft.com/office/drawing/2014/main" id="{E7F09BFF-E492-48EB-BEC6-9C6E5E04A0C8}"/>
               </a:ext>
             </a:extLst>
@@ -4584,7 +4686,7 @@
           </a:ln>
           <a:extLst>
             <a:ext uri="{C572A759-6A51-4108-AA02-DFA0A04FC94B}">
-              <ma14:wrappingTextBoxFlag xmlns:ma14="http://schemas.microsoft.com/office/mac/drawingml/2011/main" xmlns="" val="1"/>
+              <ma14:wrappingTextBoxFlag xmlns="" xmlns:ma14="http://schemas.microsoft.com/office/mac/drawingml/2011/main" val="1"/>
             </a:ext>
           </a:extLst>
         </p:spPr>

</xml_diff>